<commit_message>
edbt short paper submission
</commit_message>
<xml_diff>
--- a/paper/edbt2017short/figs/model.pptx
+++ b/paper/edbt2017short/figs/model.pptx
@@ -5,11 +5,12 @@
     <p:sldMasterId id="2147483648" r:id="rId1"/>
   </p:sldMasterIdLst>
   <p:notesMasterIdLst>
-    <p:notesMasterId r:id="rId4"/>
+    <p:notesMasterId r:id="rId5"/>
   </p:notesMasterIdLst>
   <p:sldIdLst>
     <p:sldId id="269" r:id="rId2"/>
     <p:sldId id="270" r:id="rId3"/>
+    <p:sldId id="271" r:id="rId4"/>
   </p:sldIdLst>
   <p:sldSz cx="12192000" cy="6858000"/>
   <p:notesSz cx="6858000" cy="9144000"/>
@@ -209,7 +210,7 @@
           <a:p>
             <a:fld id="{E7D59436-7EB8-904B-8F6C-AF150029F557}" type="datetimeFigureOut">
               <a:rPr lang="en-US" smtClean="0"/>
-              <a:t>10/21/16</a:t>
+              <a:t>11/14/16</a:t>
             </a:fld>
             <a:endParaRPr lang="en-US"/>
           </a:p>
@@ -477,6 +478,90 @@
 </p:notesMaster>
 </file>
 
+<file path=ppt/notesSlides/notesSlide1.xml><?xml version="1.0" encoding="utf-8"?>
+<p:notes xmlns:a="http://schemas.openxmlformats.org/drawingml/2006/main" xmlns:r="http://schemas.openxmlformats.org/officeDocument/2006/relationships" xmlns:p="http://schemas.openxmlformats.org/presentationml/2006/main">
+  <p:cSld>
+    <p:spTree>
+      <p:nvGrpSpPr>
+        <p:cNvPr id="1" name=""/>
+        <p:cNvGrpSpPr/>
+        <p:nvPr/>
+      </p:nvGrpSpPr>
+      <p:grpSpPr>
+        <a:xfrm>
+          <a:off x="0" y="0"/>
+          <a:ext cx="0" cy="0"/>
+          <a:chOff x="0" y="0"/>
+          <a:chExt cx="0" cy="0"/>
+        </a:xfrm>
+      </p:grpSpPr>
+      <p:sp>
+        <p:nvSpPr>
+          <p:cNvPr id="2" name="Slide Image Placeholder 1"/>
+          <p:cNvSpPr>
+            <a:spLocks noGrp="1" noRot="1" noChangeAspect="1"/>
+          </p:cNvSpPr>
+          <p:nvPr>
+            <p:ph type="sldImg"/>
+          </p:nvPr>
+        </p:nvSpPr>
+        <p:spPr/>
+      </p:sp>
+      <p:sp>
+        <p:nvSpPr>
+          <p:cNvPr id="3" name="Notes Placeholder 2"/>
+          <p:cNvSpPr>
+            <a:spLocks noGrp="1"/>
+          </p:cNvSpPr>
+          <p:nvPr>
+            <p:ph type="body" idx="1"/>
+          </p:nvPr>
+        </p:nvSpPr>
+        <p:spPr/>
+        <p:txBody>
+          <a:bodyPr/>
+          <a:lstStyle/>
+          <a:p>
+            <a:endParaRPr lang="en-US" dirty="0"/>
+          </a:p>
+        </p:txBody>
+      </p:sp>
+      <p:sp>
+        <p:nvSpPr>
+          <p:cNvPr id="4" name="Slide Number Placeholder 3"/>
+          <p:cNvSpPr>
+            <a:spLocks noGrp="1"/>
+          </p:cNvSpPr>
+          <p:nvPr>
+            <p:ph type="sldNum" sz="quarter" idx="10"/>
+          </p:nvPr>
+        </p:nvSpPr>
+        <p:spPr/>
+        <p:txBody>
+          <a:bodyPr/>
+          <a:lstStyle/>
+          <a:p>
+            <a:fld id="{971913F5-612E-0C40-AC0E-4E8B1AC0EA5E}" type="slidenum">
+              <a:rPr lang="en-US" smtClean="0"/>
+              <a:t>3</a:t>
+            </a:fld>
+            <a:endParaRPr lang="en-US"/>
+          </a:p>
+        </p:txBody>
+      </p:sp>
+    </p:spTree>
+    <p:extLst>
+      <p:ext uri="{BB962C8B-B14F-4D97-AF65-F5344CB8AC3E}">
+        <p14:creationId xmlns:p14="http://schemas.microsoft.com/office/powerpoint/2010/main" val="1037407165"/>
+      </p:ext>
+    </p:extLst>
+  </p:cSld>
+  <p:clrMapOvr>
+    <a:masterClrMapping/>
+  </p:clrMapOvr>
+</p:notes>
+</file>
+
 <file path=ppt/slideLayouts/slideLayout1.xml><?xml version="1.0" encoding="utf-8"?>
 <p:sldLayout xmlns:a="http://schemas.openxmlformats.org/drawingml/2006/main" xmlns:r="http://schemas.openxmlformats.org/officeDocument/2006/relationships" xmlns:p="http://schemas.openxmlformats.org/presentationml/2006/main" showMasterSp="0" type="title" preserve="1">
   <p:cSld name="Title Slide">
@@ -647,7 +732,7 @@
             <a:fld id="{87DE6118-2437-4B30-8E3C-4D2BE6020583}" type="datetimeFigureOut">
               <a:rPr lang="en-US" dirty="0"/>
               <a:pPr/>
-              <a:t>10/21/16</a:t>
+              <a:t>11/14/16</a:t>
             </a:fld>
             <a:endParaRPr lang="en-US" dirty="0"/>
           </a:p>
@@ -973,7 +1058,7 @@
           <a:p>
             <a:fld id="{87DE6118-2437-4B30-8E3C-4D2BE6020583}" type="datetimeFigureOut">
               <a:rPr lang="en-US" dirty="0"/>
-              <a:t>10/21/16</a:t>
+              <a:t>11/14/16</a:t>
             </a:fld>
             <a:endParaRPr lang="en-US" dirty="0"/>
           </a:p>
@@ -1148,7 +1233,7 @@
           <a:p>
             <a:fld id="{87DE6118-2437-4B30-8E3C-4D2BE6020583}" type="datetimeFigureOut">
               <a:rPr lang="en-US" dirty="0"/>
-              <a:t>10/21/16</a:t>
+              <a:t>11/14/16</a:t>
             </a:fld>
             <a:endParaRPr lang="en-US" dirty="0"/>
           </a:p>
@@ -1313,7 +1398,7 @@
           <a:p>
             <a:fld id="{87DE6118-2437-4B30-8E3C-4D2BE6020583}" type="datetimeFigureOut">
               <a:rPr lang="en-US" dirty="0"/>
-              <a:t>10/21/16</a:t>
+              <a:t>11/14/16</a:t>
             </a:fld>
             <a:endParaRPr lang="en-US" dirty="0"/>
           </a:p>
@@ -1586,7 +1671,7 @@
             <a:fld id="{87DE6118-2437-4B30-8E3C-4D2BE6020583}" type="datetimeFigureOut">
               <a:rPr lang="en-US" dirty="0"/>
               <a:pPr/>
-              <a:t>10/21/16</a:t>
+              <a:t>11/14/16</a:t>
             </a:fld>
             <a:endParaRPr lang="en-US" dirty="0"/>
           </a:p>
@@ -1976,7 +2061,7 @@
           <a:p>
             <a:fld id="{87DE6118-2437-4B30-8E3C-4D2BE6020583}" type="datetimeFigureOut">
               <a:rPr lang="en-US" dirty="0"/>
-              <a:t>10/21/16</a:t>
+              <a:t>11/14/16</a:t>
             </a:fld>
             <a:endParaRPr lang="en-US" dirty="0"/>
           </a:p>
@@ -2448,7 +2533,7 @@
           <a:p>
             <a:fld id="{87DE6118-2437-4B30-8E3C-4D2BE6020583}" type="datetimeFigureOut">
               <a:rPr lang="en-US" dirty="0"/>
-              <a:t>10/21/16</a:t>
+              <a:t>11/14/16</a:t>
             </a:fld>
             <a:endParaRPr lang="en-US" dirty="0"/>
           </a:p>
@@ -2561,7 +2646,7 @@
           <a:p>
             <a:fld id="{87DE6118-2437-4B30-8E3C-4D2BE6020583}" type="datetimeFigureOut">
               <a:rPr lang="en-US" dirty="0"/>
-              <a:t>10/21/16</a:t>
+              <a:t>11/14/16</a:t>
             </a:fld>
             <a:endParaRPr lang="en-US" dirty="0"/>
           </a:p>
@@ -2651,7 +2736,7 @@
           <a:p>
             <a:fld id="{87DE6118-2437-4B30-8E3C-4D2BE6020583}" type="datetimeFigureOut">
               <a:rPr lang="en-US" dirty="0"/>
-              <a:t>10/21/16</a:t>
+              <a:t>11/14/16</a:t>
             </a:fld>
             <a:endParaRPr lang="en-US" dirty="0"/>
           </a:p>
@@ -2993,7 +3078,7 @@
             <a:fld id="{87DE6118-2437-4B30-8E3C-4D2BE6020583}" type="datetimeFigureOut">
               <a:rPr lang="en-US" dirty="0"/>
               <a:pPr/>
-              <a:t>10/21/16</a:t>
+              <a:t>11/14/16</a:t>
             </a:fld>
             <a:endParaRPr lang="en-US" dirty="0"/>
           </a:p>
@@ -3378,7 +3463,7 @@
             <a:fld id="{87DE6118-2437-4B30-8E3C-4D2BE6020583}" type="datetimeFigureOut">
               <a:rPr lang="en-US" dirty="0"/>
               <a:pPr/>
-              <a:t>10/21/16</a:t>
+              <a:t>11/14/16</a:t>
             </a:fld>
             <a:endParaRPr lang="en-US" dirty="0"/>
           </a:p>
@@ -3653,7 +3738,7 @@
             <a:fld id="{87DE6118-2437-4B30-8E3C-4D2BE6020583}" type="datetimeFigureOut">
               <a:rPr lang="en-US" dirty="0"/>
               <a:pPr/>
-              <a:t>10/21/16</a:t>
+              <a:t>11/14/16</a:t>
             </a:fld>
             <a:endParaRPr lang="en-US" dirty="0"/>
           </a:p>
@@ -6508,7 +6593,6 @@
                         <a:rPr lang="en-US" sz="1600" dirty="0" smtClean="0"/>
                         <a:t>[t3, t5)</a:t>
                       </a:r>
-                      <a:endParaRPr lang="en-US" sz="1600" dirty="0" smtClean="0"/>
                     </a:p>
                   </a:txBody>
                   <a:tcPr marL="68580" marR="68580" marT="34290" marB="34290">
@@ -6808,7 +6892,6 @@
                         <a:rPr lang="en-US" sz="1600" dirty="0" smtClean="0"/>
                         <a:t>[t2, t3)</a:t>
                       </a:r>
-                      <a:endParaRPr lang="en-US" sz="1600" dirty="0" smtClean="0"/>
                     </a:p>
                   </a:txBody>
                   <a:tcPr marL="68580" marR="68580" marT="34290" marB="34290" anchor="ctr">
@@ -6919,7 +7002,6 @@
                         <a:rPr lang="en-US" sz="1600" dirty="0" smtClean="0"/>
                         <a:t>[t3, t5)</a:t>
                       </a:r>
-                      <a:endParaRPr lang="en-US" sz="1600" dirty="0" smtClean="0"/>
                     </a:p>
                   </a:txBody>
                   <a:tcPr marL="68580" marR="68580" marT="34290" marB="34290" anchor="ctr">
@@ -7037,7 +7119,6 @@
                         <a:rPr lang="en-US" sz="1600" dirty="0" smtClean="0"/>
                         <a:t>[t1, t5)</a:t>
                       </a:r>
-                      <a:endParaRPr lang="en-US" sz="1600" dirty="0" smtClean="0"/>
                     </a:p>
                   </a:txBody>
                   <a:tcPr marL="68580" marR="68580" marT="34290" marB="34290" anchor="ctr">
@@ -7164,11 +7245,7 @@
             </a:r>
             <a:r>
               <a:rPr lang="en-US" sz="2400" dirty="0" smtClean="0"/>
-              <a:t>a</a:t>
-            </a:r>
-            <a:r>
-              <a:rPr lang="en-US" sz="2400" dirty="0" smtClean="0"/>
-              <a:t>)</a:t>
+              <a:t>a)</a:t>
             </a:r>
             <a:endParaRPr lang="en-US" sz="2400" dirty="0"/>
           </a:p>
@@ -7232,6 +7309,2266 @@
     <p:extLst>
       <p:ext uri="{BB962C8B-B14F-4D97-AF65-F5344CB8AC3E}">
         <p14:creationId xmlns:p14="http://schemas.microsoft.com/office/powerpoint/2010/main" val="851473536"/>
+      </p:ext>
+    </p:extLst>
+  </p:cSld>
+  <p:clrMapOvr>
+    <a:masterClrMapping/>
+  </p:clrMapOvr>
+</p:sld>
+</file>
+
+<file path=ppt/slides/slide3.xml><?xml version="1.0" encoding="utf-8"?>
+<p:sld xmlns:a="http://schemas.openxmlformats.org/drawingml/2006/main" xmlns:r="http://schemas.openxmlformats.org/officeDocument/2006/relationships" xmlns:p="http://schemas.openxmlformats.org/presentationml/2006/main">
+  <p:cSld>
+    <p:spTree>
+      <p:nvGrpSpPr>
+        <p:cNvPr id="1" name=""/>
+        <p:cNvGrpSpPr/>
+        <p:nvPr/>
+      </p:nvGrpSpPr>
+      <p:grpSpPr>
+        <a:xfrm>
+          <a:off x="0" y="0"/>
+          <a:ext cx="0" cy="0"/>
+          <a:chOff x="0" y="0"/>
+          <a:chExt cx="0" cy="0"/>
+        </a:xfrm>
+      </p:grpSpPr>
+      <p:grpSp>
+        <p:nvGrpSpPr>
+          <p:cNvPr id="93" name="Group 92"/>
+          <p:cNvGrpSpPr/>
+          <p:nvPr/>
+        </p:nvGrpSpPr>
+        <p:grpSpPr>
+          <a:xfrm>
+            <a:off x="1154614" y="2154465"/>
+            <a:ext cx="3972875" cy="1307555"/>
+            <a:chOff x="1154614" y="2154465"/>
+            <a:chExt cx="3972875" cy="1307555"/>
+          </a:xfrm>
+        </p:grpSpPr>
+        <p:cxnSp>
+          <p:nvCxnSpPr>
+            <p:cNvPr id="8" name="Straight Connector 7"/>
+            <p:cNvCxnSpPr/>
+            <p:nvPr/>
+          </p:nvCxnSpPr>
+          <p:spPr>
+            <a:xfrm flipH="1">
+              <a:off x="4222361" y="2171361"/>
+              <a:ext cx="8016" cy="1280160"/>
+            </a:xfrm>
+            <a:prstGeom prst="line">
+              <a:avLst/>
+            </a:prstGeom>
+            <a:ln w="22225">
+              <a:solidFill>
+                <a:schemeClr val="tx1"/>
+              </a:solidFill>
+              <a:prstDash val="lgDash"/>
+            </a:ln>
+          </p:spPr>
+          <p:style>
+            <a:lnRef idx="1">
+              <a:schemeClr val="accent1"/>
+            </a:lnRef>
+            <a:fillRef idx="0">
+              <a:schemeClr val="accent1"/>
+            </a:fillRef>
+            <a:effectRef idx="0">
+              <a:schemeClr val="accent1"/>
+            </a:effectRef>
+            <a:fontRef idx="minor">
+              <a:schemeClr val="tx1"/>
+            </a:fontRef>
+          </p:style>
+        </p:cxnSp>
+        <p:cxnSp>
+          <p:nvCxnSpPr>
+            <p:cNvPr id="9" name="Straight Connector 8"/>
+            <p:cNvCxnSpPr/>
+            <p:nvPr/>
+          </p:nvCxnSpPr>
+          <p:spPr>
+            <a:xfrm flipH="1">
+              <a:off x="2578102" y="2154465"/>
+              <a:ext cx="8016" cy="1280160"/>
+            </a:xfrm>
+            <a:prstGeom prst="line">
+              <a:avLst/>
+            </a:prstGeom>
+            <a:ln w="22225">
+              <a:solidFill>
+                <a:schemeClr val="tx1"/>
+              </a:solidFill>
+              <a:prstDash val="lgDash"/>
+            </a:ln>
+          </p:spPr>
+          <p:style>
+            <a:lnRef idx="1">
+              <a:schemeClr val="accent1"/>
+            </a:lnRef>
+            <a:fillRef idx="0">
+              <a:schemeClr val="accent1"/>
+            </a:fillRef>
+            <a:effectRef idx="0">
+              <a:schemeClr val="accent1"/>
+            </a:effectRef>
+            <a:fontRef idx="minor">
+              <a:schemeClr val="tx1"/>
+            </a:fontRef>
+          </p:style>
+        </p:cxnSp>
+        <p:cxnSp>
+          <p:nvCxnSpPr>
+            <p:cNvPr id="10" name="Straight Connector 9"/>
+            <p:cNvCxnSpPr/>
+            <p:nvPr/>
+          </p:nvCxnSpPr>
+          <p:spPr>
+            <a:xfrm flipH="1">
+              <a:off x="3428222" y="2171361"/>
+              <a:ext cx="8016" cy="1280160"/>
+            </a:xfrm>
+            <a:prstGeom prst="line">
+              <a:avLst/>
+            </a:prstGeom>
+            <a:ln w="22225">
+              <a:solidFill>
+                <a:schemeClr val="tx1"/>
+              </a:solidFill>
+              <a:prstDash val="lgDash"/>
+            </a:ln>
+          </p:spPr>
+          <p:style>
+            <a:lnRef idx="1">
+              <a:schemeClr val="accent1"/>
+            </a:lnRef>
+            <a:fillRef idx="0">
+              <a:schemeClr val="accent1"/>
+            </a:fillRef>
+            <a:effectRef idx="0">
+              <a:schemeClr val="accent1"/>
+            </a:effectRef>
+            <a:fontRef idx="minor">
+              <a:schemeClr val="tx1"/>
+            </a:fontRef>
+          </p:style>
+        </p:cxnSp>
+        <p:cxnSp>
+          <p:nvCxnSpPr>
+            <p:cNvPr id="24" name="Straight Arrow Connector 23"/>
+            <p:cNvCxnSpPr/>
+            <p:nvPr/>
+          </p:nvCxnSpPr>
+          <p:spPr>
+            <a:xfrm flipV="1">
+              <a:off x="1840708" y="2273300"/>
+              <a:ext cx="792" cy="1188720"/>
+            </a:xfrm>
+            <a:prstGeom prst="straightConnector1">
+              <a:avLst/>
+            </a:prstGeom>
+            <a:ln w="38100">
+              <a:solidFill>
+                <a:schemeClr val="tx1"/>
+              </a:solidFill>
+              <a:tailEnd type="none" w="lg" len="lg"/>
+            </a:ln>
+          </p:spPr>
+          <p:style>
+            <a:lnRef idx="1">
+              <a:schemeClr val="accent1"/>
+            </a:lnRef>
+            <a:fillRef idx="0">
+              <a:schemeClr val="accent1"/>
+            </a:fillRef>
+            <a:effectRef idx="0">
+              <a:schemeClr val="accent1"/>
+            </a:effectRef>
+            <a:fontRef idx="minor">
+              <a:schemeClr val="tx1"/>
+            </a:fontRef>
+          </p:style>
+        </p:cxnSp>
+        <p:cxnSp>
+          <p:nvCxnSpPr>
+            <p:cNvPr id="32" name="Straight Arrow Connector 31"/>
+            <p:cNvCxnSpPr/>
+            <p:nvPr/>
+          </p:nvCxnSpPr>
+          <p:spPr>
+            <a:xfrm>
+              <a:off x="1835649" y="3454400"/>
+              <a:ext cx="3291840" cy="0"/>
+            </a:xfrm>
+            <a:prstGeom prst="straightConnector1">
+              <a:avLst/>
+            </a:prstGeom>
+            <a:ln w="22225">
+              <a:solidFill>
+                <a:schemeClr val="tx1"/>
+              </a:solidFill>
+              <a:tailEnd type="stealth" w="lg" len="lg"/>
+            </a:ln>
+          </p:spPr>
+          <p:style>
+            <a:lnRef idx="1">
+              <a:schemeClr val="accent1"/>
+            </a:lnRef>
+            <a:fillRef idx="0">
+              <a:schemeClr val="accent1"/>
+            </a:fillRef>
+            <a:effectRef idx="0">
+              <a:schemeClr val="accent1"/>
+            </a:effectRef>
+            <a:fontRef idx="minor">
+              <a:schemeClr val="tx1"/>
+            </a:fontRef>
+          </p:style>
+        </p:cxnSp>
+        <p:cxnSp>
+          <p:nvCxnSpPr>
+            <p:cNvPr id="34" name="Straight Arrow Connector 33"/>
+            <p:cNvCxnSpPr/>
+            <p:nvPr/>
+          </p:nvCxnSpPr>
+          <p:spPr>
+            <a:xfrm>
+              <a:off x="1860271" y="3175000"/>
+              <a:ext cx="3200400" cy="0"/>
+            </a:xfrm>
+            <a:prstGeom prst="straightConnector1">
+              <a:avLst/>
+            </a:prstGeom>
+            <a:ln w="12700">
+              <a:solidFill>
+                <a:schemeClr val="tx1"/>
+              </a:solidFill>
+              <a:tailEnd type="none" w="lg" len="lg"/>
+            </a:ln>
+          </p:spPr>
+          <p:style>
+            <a:lnRef idx="1">
+              <a:schemeClr val="accent1"/>
+            </a:lnRef>
+            <a:fillRef idx="0">
+              <a:schemeClr val="accent1"/>
+            </a:fillRef>
+            <a:effectRef idx="0">
+              <a:schemeClr val="accent1"/>
+            </a:effectRef>
+            <a:fontRef idx="minor">
+              <a:schemeClr val="tx1"/>
+            </a:fontRef>
+          </p:style>
+        </p:cxnSp>
+        <p:cxnSp>
+          <p:nvCxnSpPr>
+            <p:cNvPr id="36" name="Straight Arrow Connector 35"/>
+            <p:cNvCxnSpPr/>
+            <p:nvPr/>
+          </p:nvCxnSpPr>
+          <p:spPr>
+            <a:xfrm>
+              <a:off x="1822171" y="2603500"/>
+              <a:ext cx="3246120" cy="0"/>
+            </a:xfrm>
+            <a:prstGeom prst="straightConnector1">
+              <a:avLst/>
+            </a:prstGeom>
+            <a:ln w="12700">
+              <a:solidFill>
+                <a:schemeClr val="tx1"/>
+              </a:solidFill>
+              <a:tailEnd type="none" w="lg" len="lg"/>
+            </a:ln>
+          </p:spPr>
+          <p:style>
+            <a:lnRef idx="1">
+              <a:schemeClr val="accent1"/>
+            </a:lnRef>
+            <a:fillRef idx="0">
+              <a:schemeClr val="accent1"/>
+            </a:fillRef>
+            <a:effectRef idx="0">
+              <a:schemeClr val="accent1"/>
+            </a:effectRef>
+            <a:fontRef idx="minor">
+              <a:schemeClr val="tx1"/>
+            </a:fontRef>
+          </p:style>
+        </p:cxnSp>
+        <p:sp>
+          <p:nvSpPr>
+            <p:cNvPr id="37" name="Rectangle 36"/>
+            <p:cNvSpPr/>
+            <p:nvPr/>
+          </p:nvSpPr>
+          <p:spPr>
+            <a:xfrm>
+              <a:off x="1154614" y="2431336"/>
+              <a:ext cx="703458" cy="315471"/>
+            </a:xfrm>
+            <a:prstGeom prst="rect">
+              <a:avLst/>
+            </a:prstGeom>
+          </p:spPr>
+          <p:txBody>
+            <a:bodyPr wrap="none" lIns="68580" tIns="34290" rIns="68580" bIns="34290">
+              <a:noAutofit/>
+            </a:bodyPr>
+            <a:lstStyle/>
+            <a:p>
+              <a:pPr algn="ctr"/>
+              <a:r>
+                <a:rPr lang="en-US" sz="1600" b="1" dirty="0"/>
+                <a:t>v</a:t>
+              </a:r>
+              <a:r>
+                <a:rPr lang="en-US" sz="1600" b="1" dirty="0" smtClean="0"/>
+                <a:t>1</a:t>
+              </a:r>
+              <a:endParaRPr lang="en-US" sz="1600" b="1" dirty="0"/>
+            </a:p>
+          </p:txBody>
+        </p:sp>
+        <p:sp>
+          <p:nvSpPr>
+            <p:cNvPr id="38" name="Rectangle 37"/>
+            <p:cNvSpPr/>
+            <p:nvPr/>
+          </p:nvSpPr>
+          <p:spPr>
+            <a:xfrm>
+              <a:off x="1154614" y="2710736"/>
+              <a:ext cx="703458" cy="315471"/>
+            </a:xfrm>
+            <a:prstGeom prst="rect">
+              <a:avLst/>
+            </a:prstGeom>
+          </p:spPr>
+          <p:txBody>
+            <a:bodyPr wrap="none" lIns="68580" tIns="34290" rIns="68580" bIns="34290">
+              <a:noAutofit/>
+            </a:bodyPr>
+            <a:lstStyle/>
+            <a:p>
+              <a:pPr algn="ctr"/>
+              <a:r>
+                <a:rPr lang="en-US" sz="1600" b="1" dirty="0" smtClean="0"/>
+                <a:t>v</a:t>
+              </a:r>
+              <a:r>
+                <a:rPr lang="en-US" sz="1600" b="1" dirty="0"/>
+                <a:t>2</a:t>
+              </a:r>
+              <a:endParaRPr lang="en-US" sz="1600" b="1" dirty="0"/>
+            </a:p>
+          </p:txBody>
+        </p:sp>
+        <p:sp>
+          <p:nvSpPr>
+            <p:cNvPr id="39" name="Rectangle 38"/>
+            <p:cNvSpPr/>
+            <p:nvPr/>
+          </p:nvSpPr>
+          <p:spPr>
+            <a:xfrm>
+              <a:off x="1154614" y="3015536"/>
+              <a:ext cx="703458" cy="315471"/>
+            </a:xfrm>
+            <a:prstGeom prst="rect">
+              <a:avLst/>
+            </a:prstGeom>
+          </p:spPr>
+          <p:txBody>
+            <a:bodyPr wrap="none" lIns="68580" tIns="34290" rIns="68580" bIns="34290">
+              <a:noAutofit/>
+            </a:bodyPr>
+            <a:lstStyle/>
+            <a:p>
+              <a:pPr algn="ctr"/>
+              <a:r>
+                <a:rPr lang="en-US" sz="1600" b="1" dirty="0" smtClean="0"/>
+                <a:t>v</a:t>
+              </a:r>
+              <a:r>
+                <a:rPr lang="en-US" sz="1600" b="1" dirty="0"/>
+                <a:t>3</a:t>
+              </a:r>
+              <a:endParaRPr lang="en-US" sz="1600" b="1" dirty="0"/>
+            </a:p>
+          </p:txBody>
+        </p:sp>
+        <p:cxnSp>
+          <p:nvCxnSpPr>
+            <p:cNvPr id="40" name="Straight Arrow Connector 39"/>
+            <p:cNvCxnSpPr/>
+            <p:nvPr/>
+          </p:nvCxnSpPr>
+          <p:spPr>
+            <a:xfrm>
+              <a:off x="2586118" y="2893871"/>
+              <a:ext cx="822960" cy="0"/>
+            </a:xfrm>
+            <a:prstGeom prst="straightConnector1">
+              <a:avLst/>
+            </a:prstGeom>
+            <a:ln w="12700">
+              <a:solidFill>
+                <a:schemeClr val="tx1"/>
+              </a:solidFill>
+              <a:tailEnd type="none" w="lg" len="lg"/>
+            </a:ln>
+          </p:spPr>
+          <p:style>
+            <a:lnRef idx="1">
+              <a:schemeClr val="accent1"/>
+            </a:lnRef>
+            <a:fillRef idx="0">
+              <a:schemeClr val="accent1"/>
+            </a:fillRef>
+            <a:effectRef idx="0">
+              <a:schemeClr val="accent1"/>
+            </a:effectRef>
+            <a:fontRef idx="minor">
+              <a:schemeClr val="tx1"/>
+            </a:fontRef>
+          </p:style>
+        </p:cxnSp>
+        <p:cxnSp>
+          <p:nvCxnSpPr>
+            <p:cNvPr id="41" name="Straight Arrow Connector 40"/>
+            <p:cNvCxnSpPr/>
+            <p:nvPr/>
+          </p:nvCxnSpPr>
+          <p:spPr>
+            <a:xfrm>
+              <a:off x="3432230" y="2893871"/>
+              <a:ext cx="1645920" cy="0"/>
+            </a:xfrm>
+            <a:prstGeom prst="straightConnector1">
+              <a:avLst/>
+            </a:prstGeom>
+            <a:ln w="12700">
+              <a:solidFill>
+                <a:schemeClr val="tx1"/>
+              </a:solidFill>
+              <a:tailEnd type="none" w="lg" len="lg"/>
+            </a:ln>
+          </p:spPr>
+          <p:style>
+            <a:lnRef idx="1">
+              <a:schemeClr val="accent1"/>
+            </a:lnRef>
+            <a:fillRef idx="0">
+              <a:schemeClr val="accent1"/>
+            </a:fillRef>
+            <a:effectRef idx="0">
+              <a:schemeClr val="accent1"/>
+            </a:effectRef>
+            <a:fontRef idx="minor">
+              <a:schemeClr val="tx1"/>
+            </a:fontRef>
+          </p:style>
+        </p:cxnSp>
+        <p:sp>
+          <p:nvSpPr>
+            <p:cNvPr id="42" name="Oval 41"/>
+            <p:cNvSpPr/>
+            <p:nvPr/>
+          </p:nvSpPr>
+          <p:spPr>
+            <a:xfrm>
+              <a:off x="2538329" y="2563672"/>
+              <a:ext cx="91440" cy="91440"/>
+            </a:xfrm>
+            <a:prstGeom prst="ellipse">
+              <a:avLst/>
+            </a:prstGeom>
+            <a:solidFill>
+              <a:srgbClr val="0070C0"/>
+            </a:solidFill>
+          </p:spPr>
+          <p:style>
+            <a:lnRef idx="2">
+              <a:schemeClr val="accent1">
+                <a:shade val="50000"/>
+              </a:schemeClr>
+            </a:lnRef>
+            <a:fillRef idx="1">
+              <a:schemeClr val="accent1"/>
+            </a:fillRef>
+            <a:effectRef idx="0">
+              <a:schemeClr val="accent1"/>
+            </a:effectRef>
+            <a:fontRef idx="minor">
+              <a:schemeClr val="lt1"/>
+            </a:fontRef>
+          </p:style>
+          <p:txBody>
+            <a:bodyPr rtlCol="0" anchor="ctr"/>
+            <a:lstStyle/>
+            <a:p>
+              <a:pPr algn="ctr"/>
+              <a:endParaRPr lang="en-US"/>
+            </a:p>
+          </p:txBody>
+        </p:sp>
+        <p:sp>
+          <p:nvSpPr>
+            <p:cNvPr id="43" name="Oval 42"/>
+            <p:cNvSpPr/>
+            <p:nvPr/>
+          </p:nvSpPr>
+          <p:spPr>
+            <a:xfrm>
+              <a:off x="3389229" y="2855772"/>
+              <a:ext cx="91440" cy="91440"/>
+            </a:xfrm>
+            <a:prstGeom prst="ellipse">
+              <a:avLst/>
+            </a:prstGeom>
+            <a:solidFill>
+              <a:srgbClr val="0070C0"/>
+            </a:solidFill>
+          </p:spPr>
+          <p:style>
+            <a:lnRef idx="2">
+              <a:schemeClr val="accent1">
+                <a:shade val="50000"/>
+              </a:schemeClr>
+            </a:lnRef>
+            <a:fillRef idx="1">
+              <a:schemeClr val="accent1"/>
+            </a:fillRef>
+            <a:effectRef idx="0">
+              <a:schemeClr val="accent1"/>
+            </a:effectRef>
+            <a:fontRef idx="minor">
+              <a:schemeClr val="lt1"/>
+            </a:fontRef>
+          </p:style>
+          <p:txBody>
+            <a:bodyPr rtlCol="0" anchor="ctr"/>
+            <a:lstStyle/>
+            <a:p>
+              <a:pPr algn="ctr"/>
+              <a:endParaRPr lang="en-US"/>
+            </a:p>
+          </p:txBody>
+        </p:sp>
+        <p:sp>
+          <p:nvSpPr>
+            <p:cNvPr id="44" name="Oval 43"/>
+            <p:cNvSpPr/>
+            <p:nvPr/>
+          </p:nvSpPr>
+          <p:spPr>
+            <a:xfrm>
+              <a:off x="3389229" y="2563672"/>
+              <a:ext cx="91440" cy="91440"/>
+            </a:xfrm>
+            <a:prstGeom prst="ellipse">
+              <a:avLst/>
+            </a:prstGeom>
+            <a:solidFill>
+              <a:srgbClr val="0070C0"/>
+            </a:solidFill>
+          </p:spPr>
+          <p:style>
+            <a:lnRef idx="2">
+              <a:schemeClr val="accent1">
+                <a:shade val="50000"/>
+              </a:schemeClr>
+            </a:lnRef>
+            <a:fillRef idx="1">
+              <a:schemeClr val="accent1"/>
+            </a:fillRef>
+            <a:effectRef idx="0">
+              <a:schemeClr val="accent1"/>
+            </a:effectRef>
+            <a:fontRef idx="minor">
+              <a:schemeClr val="lt1"/>
+            </a:fontRef>
+          </p:style>
+          <p:txBody>
+            <a:bodyPr rtlCol="0" anchor="ctr"/>
+            <a:lstStyle/>
+            <a:p>
+              <a:pPr algn="ctr"/>
+              <a:endParaRPr lang="en-US"/>
+            </a:p>
+          </p:txBody>
+        </p:sp>
+        <p:sp>
+          <p:nvSpPr>
+            <p:cNvPr id="45" name="Oval 44"/>
+            <p:cNvSpPr/>
+            <p:nvPr/>
+          </p:nvSpPr>
+          <p:spPr>
+            <a:xfrm>
+              <a:off x="4176629" y="2563672"/>
+              <a:ext cx="91440" cy="91440"/>
+            </a:xfrm>
+            <a:prstGeom prst="ellipse">
+              <a:avLst/>
+            </a:prstGeom>
+            <a:solidFill>
+              <a:srgbClr val="0070C0"/>
+            </a:solidFill>
+          </p:spPr>
+          <p:style>
+            <a:lnRef idx="2">
+              <a:schemeClr val="accent1">
+                <a:shade val="50000"/>
+              </a:schemeClr>
+            </a:lnRef>
+            <a:fillRef idx="1">
+              <a:schemeClr val="accent1"/>
+            </a:fillRef>
+            <a:effectRef idx="0">
+              <a:schemeClr val="accent1"/>
+            </a:effectRef>
+            <a:fontRef idx="minor">
+              <a:schemeClr val="lt1"/>
+            </a:fontRef>
+          </p:style>
+          <p:txBody>
+            <a:bodyPr rtlCol="0" anchor="ctr"/>
+            <a:lstStyle/>
+            <a:p>
+              <a:pPr algn="ctr"/>
+              <a:endParaRPr lang="en-US"/>
+            </a:p>
+          </p:txBody>
+        </p:sp>
+        <p:sp>
+          <p:nvSpPr>
+            <p:cNvPr id="46" name="Oval 45"/>
+            <p:cNvSpPr/>
+            <p:nvPr/>
+          </p:nvSpPr>
+          <p:spPr>
+            <a:xfrm>
+              <a:off x="2538329" y="3135172"/>
+              <a:ext cx="91440" cy="91440"/>
+            </a:xfrm>
+            <a:prstGeom prst="ellipse">
+              <a:avLst/>
+            </a:prstGeom>
+            <a:solidFill>
+              <a:srgbClr val="0070C0"/>
+            </a:solidFill>
+          </p:spPr>
+          <p:style>
+            <a:lnRef idx="2">
+              <a:schemeClr val="accent1">
+                <a:shade val="50000"/>
+              </a:schemeClr>
+            </a:lnRef>
+            <a:fillRef idx="1">
+              <a:schemeClr val="accent1"/>
+            </a:fillRef>
+            <a:effectRef idx="0">
+              <a:schemeClr val="accent1"/>
+            </a:effectRef>
+            <a:fontRef idx="minor">
+              <a:schemeClr val="lt1"/>
+            </a:fontRef>
+          </p:style>
+          <p:txBody>
+            <a:bodyPr rtlCol="0" anchor="ctr"/>
+            <a:lstStyle/>
+            <a:p>
+              <a:pPr algn="ctr"/>
+              <a:endParaRPr lang="en-US"/>
+            </a:p>
+          </p:txBody>
+        </p:sp>
+        <p:sp>
+          <p:nvSpPr>
+            <p:cNvPr id="47" name="Oval 46"/>
+            <p:cNvSpPr/>
+            <p:nvPr/>
+          </p:nvSpPr>
+          <p:spPr>
+            <a:xfrm>
+              <a:off x="3389229" y="3135172"/>
+              <a:ext cx="91440" cy="91440"/>
+            </a:xfrm>
+            <a:prstGeom prst="ellipse">
+              <a:avLst/>
+            </a:prstGeom>
+            <a:solidFill>
+              <a:srgbClr val="0070C0"/>
+            </a:solidFill>
+          </p:spPr>
+          <p:style>
+            <a:lnRef idx="2">
+              <a:schemeClr val="accent1">
+                <a:shade val="50000"/>
+              </a:schemeClr>
+            </a:lnRef>
+            <a:fillRef idx="1">
+              <a:schemeClr val="accent1"/>
+            </a:fillRef>
+            <a:effectRef idx="0">
+              <a:schemeClr val="accent1"/>
+            </a:effectRef>
+            <a:fontRef idx="minor">
+              <a:schemeClr val="lt1"/>
+            </a:fontRef>
+          </p:style>
+          <p:txBody>
+            <a:bodyPr rtlCol="0" anchor="ctr"/>
+            <a:lstStyle/>
+            <a:p>
+              <a:pPr algn="ctr"/>
+              <a:endParaRPr lang="en-US"/>
+            </a:p>
+          </p:txBody>
+        </p:sp>
+        <p:sp>
+          <p:nvSpPr>
+            <p:cNvPr id="48" name="Oval 47"/>
+            <p:cNvSpPr/>
+            <p:nvPr/>
+          </p:nvSpPr>
+          <p:spPr>
+            <a:xfrm>
+              <a:off x="4176629" y="3135172"/>
+              <a:ext cx="91440" cy="91440"/>
+            </a:xfrm>
+            <a:prstGeom prst="ellipse">
+              <a:avLst/>
+            </a:prstGeom>
+            <a:solidFill>
+              <a:srgbClr val="0070C0"/>
+            </a:solidFill>
+          </p:spPr>
+          <p:style>
+            <a:lnRef idx="2">
+              <a:schemeClr val="accent1">
+                <a:shade val="50000"/>
+              </a:schemeClr>
+            </a:lnRef>
+            <a:fillRef idx="1">
+              <a:schemeClr val="accent1"/>
+            </a:fillRef>
+            <a:effectRef idx="0">
+              <a:schemeClr val="accent1"/>
+            </a:effectRef>
+            <a:fontRef idx="minor">
+              <a:schemeClr val="lt1"/>
+            </a:fontRef>
+          </p:style>
+          <p:txBody>
+            <a:bodyPr rtlCol="0" anchor="ctr"/>
+            <a:lstStyle/>
+            <a:p>
+              <a:pPr algn="ctr"/>
+              <a:endParaRPr lang="en-US"/>
+            </a:p>
+          </p:txBody>
+        </p:sp>
+        <p:sp>
+          <p:nvSpPr>
+            <p:cNvPr id="49" name="Rectangle 48"/>
+            <p:cNvSpPr/>
+            <p:nvPr/>
+          </p:nvSpPr>
+          <p:spPr>
+            <a:xfrm>
+              <a:off x="1880879" y="2302608"/>
+              <a:ext cx="703458" cy="315471"/>
+            </a:xfrm>
+            <a:prstGeom prst="rect">
+              <a:avLst/>
+            </a:prstGeom>
+          </p:spPr>
+          <p:txBody>
+            <a:bodyPr wrap="none" lIns="68580" tIns="34290" rIns="68580" bIns="34290">
+              <a:noAutofit/>
+            </a:bodyPr>
+            <a:lstStyle/>
+            <a:p>
+              <a:pPr algn="ctr"/>
+              <a:r>
+                <a:rPr lang="en-US" dirty="0" smtClean="0"/>
+                <a:t>[t1,t2)</a:t>
+              </a:r>
+              <a:endParaRPr lang="en-US" dirty="0"/>
+            </a:p>
+          </p:txBody>
+        </p:sp>
+        <p:sp>
+          <p:nvSpPr>
+            <p:cNvPr id="50" name="Rectangle 49"/>
+            <p:cNvSpPr/>
+            <p:nvPr/>
+          </p:nvSpPr>
+          <p:spPr>
+            <a:xfrm>
+              <a:off x="1880879" y="2886808"/>
+              <a:ext cx="703458" cy="315471"/>
+            </a:xfrm>
+            <a:prstGeom prst="rect">
+              <a:avLst/>
+            </a:prstGeom>
+          </p:spPr>
+          <p:txBody>
+            <a:bodyPr wrap="none" lIns="68580" tIns="34290" rIns="68580" bIns="34290">
+              <a:noAutofit/>
+            </a:bodyPr>
+            <a:lstStyle/>
+            <a:p>
+              <a:pPr algn="ctr"/>
+              <a:r>
+                <a:rPr lang="en-US" dirty="0" smtClean="0"/>
+                <a:t>[t1,t2)</a:t>
+              </a:r>
+              <a:endParaRPr lang="en-US" dirty="0"/>
+            </a:p>
+          </p:txBody>
+        </p:sp>
+        <p:sp>
+          <p:nvSpPr>
+            <p:cNvPr id="51" name="Rectangle 50"/>
+            <p:cNvSpPr/>
+            <p:nvPr/>
+          </p:nvSpPr>
+          <p:spPr>
+            <a:xfrm>
+              <a:off x="2655441" y="2302608"/>
+              <a:ext cx="703458" cy="315471"/>
+            </a:xfrm>
+            <a:prstGeom prst="rect">
+              <a:avLst/>
+            </a:prstGeom>
+          </p:spPr>
+          <p:txBody>
+            <a:bodyPr wrap="none" lIns="68580" tIns="34290" rIns="68580" bIns="34290">
+              <a:noAutofit/>
+            </a:bodyPr>
+            <a:lstStyle/>
+            <a:p>
+              <a:pPr algn="ctr"/>
+              <a:r>
+                <a:rPr lang="en-US" dirty="0" smtClean="0"/>
+                <a:t>[t2,t3)</a:t>
+              </a:r>
+              <a:endParaRPr lang="en-US" dirty="0"/>
+            </a:p>
+          </p:txBody>
+        </p:sp>
+        <p:sp>
+          <p:nvSpPr>
+            <p:cNvPr id="52" name="Rectangle 51"/>
+            <p:cNvSpPr/>
+            <p:nvPr/>
+          </p:nvSpPr>
+          <p:spPr>
+            <a:xfrm>
+              <a:off x="2655441" y="2620108"/>
+              <a:ext cx="703458" cy="315471"/>
+            </a:xfrm>
+            <a:prstGeom prst="rect">
+              <a:avLst/>
+            </a:prstGeom>
+          </p:spPr>
+          <p:txBody>
+            <a:bodyPr wrap="none" lIns="68580" tIns="34290" rIns="68580" bIns="34290">
+              <a:noAutofit/>
+            </a:bodyPr>
+            <a:lstStyle/>
+            <a:p>
+              <a:pPr algn="ctr"/>
+              <a:r>
+                <a:rPr lang="en-US" dirty="0" smtClean="0"/>
+                <a:t>[t2,t3)</a:t>
+              </a:r>
+              <a:endParaRPr lang="en-US" dirty="0"/>
+            </a:p>
+          </p:txBody>
+        </p:sp>
+        <p:sp>
+          <p:nvSpPr>
+            <p:cNvPr id="53" name="Rectangle 52"/>
+            <p:cNvSpPr/>
+            <p:nvPr/>
+          </p:nvSpPr>
+          <p:spPr>
+            <a:xfrm>
+              <a:off x="2655441" y="2886808"/>
+              <a:ext cx="703458" cy="315471"/>
+            </a:xfrm>
+            <a:prstGeom prst="rect">
+              <a:avLst/>
+            </a:prstGeom>
+          </p:spPr>
+          <p:txBody>
+            <a:bodyPr wrap="none" lIns="68580" tIns="34290" rIns="68580" bIns="34290">
+              <a:noAutofit/>
+            </a:bodyPr>
+            <a:lstStyle/>
+            <a:p>
+              <a:pPr algn="ctr"/>
+              <a:r>
+                <a:rPr lang="en-US" dirty="0" smtClean="0"/>
+                <a:t>[t2,t3)</a:t>
+              </a:r>
+              <a:endParaRPr lang="en-US" dirty="0"/>
+            </a:p>
+          </p:txBody>
+        </p:sp>
+        <p:sp>
+          <p:nvSpPr>
+            <p:cNvPr id="54" name="Rectangle 53"/>
+            <p:cNvSpPr/>
+            <p:nvPr/>
+          </p:nvSpPr>
+          <p:spPr>
+            <a:xfrm>
+              <a:off x="3468241" y="2302608"/>
+              <a:ext cx="703458" cy="315471"/>
+            </a:xfrm>
+            <a:prstGeom prst="rect">
+              <a:avLst/>
+            </a:prstGeom>
+          </p:spPr>
+          <p:txBody>
+            <a:bodyPr wrap="none" lIns="68580" tIns="34290" rIns="68580" bIns="34290">
+              <a:noAutofit/>
+            </a:bodyPr>
+            <a:lstStyle/>
+            <a:p>
+              <a:pPr algn="ctr"/>
+              <a:r>
+                <a:rPr lang="en-US" dirty="0" smtClean="0"/>
+                <a:t>[t3,t4)</a:t>
+              </a:r>
+              <a:endParaRPr lang="en-US" dirty="0"/>
+            </a:p>
+          </p:txBody>
+        </p:sp>
+        <p:sp>
+          <p:nvSpPr>
+            <p:cNvPr id="56" name="Rectangle 55"/>
+            <p:cNvSpPr/>
+            <p:nvPr/>
+          </p:nvSpPr>
+          <p:spPr>
+            <a:xfrm>
+              <a:off x="3468241" y="2620108"/>
+              <a:ext cx="703458" cy="315471"/>
+            </a:xfrm>
+            <a:prstGeom prst="rect">
+              <a:avLst/>
+            </a:prstGeom>
+          </p:spPr>
+          <p:txBody>
+            <a:bodyPr wrap="none" lIns="68580" tIns="34290" rIns="68580" bIns="34290">
+              <a:noAutofit/>
+            </a:bodyPr>
+            <a:lstStyle/>
+            <a:p>
+              <a:pPr algn="ctr"/>
+              <a:r>
+                <a:rPr lang="en-US" dirty="0" smtClean="0"/>
+                <a:t>[t3,t4)</a:t>
+              </a:r>
+              <a:endParaRPr lang="en-US" dirty="0"/>
+            </a:p>
+          </p:txBody>
+        </p:sp>
+        <p:sp>
+          <p:nvSpPr>
+            <p:cNvPr id="57" name="Rectangle 56"/>
+            <p:cNvSpPr/>
+            <p:nvPr/>
+          </p:nvSpPr>
+          <p:spPr>
+            <a:xfrm>
+              <a:off x="3468241" y="2886808"/>
+              <a:ext cx="703458" cy="315471"/>
+            </a:xfrm>
+            <a:prstGeom prst="rect">
+              <a:avLst/>
+            </a:prstGeom>
+          </p:spPr>
+          <p:txBody>
+            <a:bodyPr wrap="none" lIns="68580" tIns="34290" rIns="68580" bIns="34290">
+              <a:noAutofit/>
+            </a:bodyPr>
+            <a:lstStyle/>
+            <a:p>
+              <a:pPr algn="ctr"/>
+              <a:r>
+                <a:rPr lang="en-US" dirty="0" smtClean="0"/>
+                <a:t>[t3,t4)</a:t>
+              </a:r>
+              <a:endParaRPr lang="en-US" dirty="0"/>
+            </a:p>
+          </p:txBody>
+        </p:sp>
+        <p:sp>
+          <p:nvSpPr>
+            <p:cNvPr id="58" name="Rectangle 57"/>
+            <p:cNvSpPr/>
+            <p:nvPr/>
+          </p:nvSpPr>
+          <p:spPr>
+            <a:xfrm>
+              <a:off x="4306441" y="2302608"/>
+              <a:ext cx="703458" cy="315471"/>
+            </a:xfrm>
+            <a:prstGeom prst="rect">
+              <a:avLst/>
+            </a:prstGeom>
+          </p:spPr>
+          <p:txBody>
+            <a:bodyPr wrap="none" lIns="68580" tIns="34290" rIns="68580" bIns="34290">
+              <a:noAutofit/>
+            </a:bodyPr>
+            <a:lstStyle/>
+            <a:p>
+              <a:pPr algn="ctr"/>
+              <a:r>
+                <a:rPr lang="en-US" dirty="0" smtClean="0"/>
+                <a:t>[t4,t5)</a:t>
+              </a:r>
+              <a:endParaRPr lang="en-US" dirty="0"/>
+            </a:p>
+          </p:txBody>
+        </p:sp>
+        <p:sp>
+          <p:nvSpPr>
+            <p:cNvPr id="59" name="Rectangle 58"/>
+            <p:cNvSpPr/>
+            <p:nvPr/>
+          </p:nvSpPr>
+          <p:spPr>
+            <a:xfrm>
+              <a:off x="4306441" y="2620108"/>
+              <a:ext cx="703458" cy="315471"/>
+            </a:xfrm>
+            <a:prstGeom prst="rect">
+              <a:avLst/>
+            </a:prstGeom>
+          </p:spPr>
+          <p:txBody>
+            <a:bodyPr wrap="none" lIns="68580" tIns="34290" rIns="68580" bIns="34290">
+              <a:noAutofit/>
+            </a:bodyPr>
+            <a:lstStyle/>
+            <a:p>
+              <a:pPr algn="ctr"/>
+              <a:r>
+                <a:rPr lang="en-US" dirty="0" smtClean="0"/>
+                <a:t>[t4,t5)</a:t>
+              </a:r>
+              <a:endParaRPr lang="en-US" dirty="0"/>
+            </a:p>
+          </p:txBody>
+        </p:sp>
+        <p:sp>
+          <p:nvSpPr>
+            <p:cNvPr id="60" name="Rectangle 59"/>
+            <p:cNvSpPr/>
+            <p:nvPr/>
+          </p:nvSpPr>
+          <p:spPr>
+            <a:xfrm>
+              <a:off x="4306441" y="2886808"/>
+              <a:ext cx="703458" cy="315471"/>
+            </a:xfrm>
+            <a:prstGeom prst="rect">
+              <a:avLst/>
+            </a:prstGeom>
+          </p:spPr>
+          <p:txBody>
+            <a:bodyPr wrap="none" lIns="68580" tIns="34290" rIns="68580" bIns="34290">
+              <a:noAutofit/>
+            </a:bodyPr>
+            <a:lstStyle/>
+            <a:p>
+              <a:pPr algn="ctr"/>
+              <a:r>
+                <a:rPr lang="en-US" dirty="0" smtClean="0"/>
+                <a:t>[t4,t5)</a:t>
+              </a:r>
+              <a:endParaRPr lang="en-US" dirty="0"/>
+            </a:p>
+          </p:txBody>
+        </p:sp>
+        <p:sp>
+          <p:nvSpPr>
+            <p:cNvPr id="91" name="Oval 90"/>
+            <p:cNvSpPr/>
+            <p:nvPr/>
+          </p:nvSpPr>
+          <p:spPr>
+            <a:xfrm>
+              <a:off x="4176629" y="2855772"/>
+              <a:ext cx="91440" cy="91440"/>
+            </a:xfrm>
+            <a:prstGeom prst="ellipse">
+              <a:avLst/>
+            </a:prstGeom>
+            <a:solidFill>
+              <a:srgbClr val="0070C0"/>
+            </a:solidFill>
+          </p:spPr>
+          <p:style>
+            <a:lnRef idx="2">
+              <a:schemeClr val="accent1">
+                <a:shade val="50000"/>
+              </a:schemeClr>
+            </a:lnRef>
+            <a:fillRef idx="1">
+              <a:schemeClr val="accent1"/>
+            </a:fillRef>
+            <a:effectRef idx="0">
+              <a:schemeClr val="accent1"/>
+            </a:effectRef>
+            <a:fontRef idx="minor">
+              <a:schemeClr val="lt1"/>
+            </a:fontRef>
+          </p:style>
+          <p:txBody>
+            <a:bodyPr rtlCol="0" anchor="ctr"/>
+            <a:lstStyle/>
+            <a:p>
+              <a:pPr algn="ctr"/>
+              <a:endParaRPr lang="en-US"/>
+            </a:p>
+          </p:txBody>
+        </p:sp>
+      </p:grpSp>
+      <p:grpSp>
+        <p:nvGrpSpPr>
+          <p:cNvPr id="94" name="Group 93"/>
+          <p:cNvGrpSpPr/>
+          <p:nvPr/>
+        </p:nvGrpSpPr>
+        <p:grpSpPr>
+          <a:xfrm>
+            <a:off x="1116514" y="3818165"/>
+            <a:ext cx="3972875" cy="1307555"/>
+            <a:chOff x="1116514" y="3818165"/>
+            <a:chExt cx="3972875" cy="1307555"/>
+          </a:xfrm>
+        </p:grpSpPr>
+        <p:cxnSp>
+          <p:nvCxnSpPr>
+            <p:cNvPr id="61" name="Straight Connector 60"/>
+            <p:cNvCxnSpPr/>
+            <p:nvPr/>
+          </p:nvCxnSpPr>
+          <p:spPr>
+            <a:xfrm flipH="1">
+              <a:off x="4184261" y="3835061"/>
+              <a:ext cx="8016" cy="1280160"/>
+            </a:xfrm>
+            <a:prstGeom prst="line">
+              <a:avLst/>
+            </a:prstGeom>
+            <a:ln w="22225">
+              <a:solidFill>
+                <a:schemeClr val="tx1"/>
+              </a:solidFill>
+              <a:prstDash val="lgDash"/>
+            </a:ln>
+          </p:spPr>
+          <p:style>
+            <a:lnRef idx="1">
+              <a:schemeClr val="accent1"/>
+            </a:lnRef>
+            <a:fillRef idx="0">
+              <a:schemeClr val="accent1"/>
+            </a:fillRef>
+            <a:effectRef idx="0">
+              <a:schemeClr val="accent1"/>
+            </a:effectRef>
+            <a:fontRef idx="minor">
+              <a:schemeClr val="tx1"/>
+            </a:fontRef>
+          </p:style>
+        </p:cxnSp>
+        <p:cxnSp>
+          <p:nvCxnSpPr>
+            <p:cNvPr id="62" name="Straight Connector 61"/>
+            <p:cNvCxnSpPr/>
+            <p:nvPr/>
+          </p:nvCxnSpPr>
+          <p:spPr>
+            <a:xfrm flipH="1">
+              <a:off x="2540002" y="3818165"/>
+              <a:ext cx="8016" cy="1280160"/>
+            </a:xfrm>
+            <a:prstGeom prst="line">
+              <a:avLst/>
+            </a:prstGeom>
+            <a:ln w="22225">
+              <a:solidFill>
+                <a:schemeClr val="tx1"/>
+              </a:solidFill>
+              <a:prstDash val="lgDash"/>
+            </a:ln>
+          </p:spPr>
+          <p:style>
+            <a:lnRef idx="1">
+              <a:schemeClr val="accent1"/>
+            </a:lnRef>
+            <a:fillRef idx="0">
+              <a:schemeClr val="accent1"/>
+            </a:fillRef>
+            <a:effectRef idx="0">
+              <a:schemeClr val="accent1"/>
+            </a:effectRef>
+            <a:fontRef idx="minor">
+              <a:schemeClr val="tx1"/>
+            </a:fontRef>
+          </p:style>
+        </p:cxnSp>
+        <p:cxnSp>
+          <p:nvCxnSpPr>
+            <p:cNvPr id="63" name="Straight Connector 62"/>
+            <p:cNvCxnSpPr/>
+            <p:nvPr/>
+          </p:nvCxnSpPr>
+          <p:spPr>
+            <a:xfrm flipH="1">
+              <a:off x="3390122" y="3835061"/>
+              <a:ext cx="8016" cy="1280160"/>
+            </a:xfrm>
+            <a:prstGeom prst="line">
+              <a:avLst/>
+            </a:prstGeom>
+            <a:ln w="22225">
+              <a:solidFill>
+                <a:schemeClr val="tx1"/>
+              </a:solidFill>
+              <a:prstDash val="lgDash"/>
+            </a:ln>
+          </p:spPr>
+          <p:style>
+            <a:lnRef idx="1">
+              <a:schemeClr val="accent1"/>
+            </a:lnRef>
+            <a:fillRef idx="0">
+              <a:schemeClr val="accent1"/>
+            </a:fillRef>
+            <a:effectRef idx="0">
+              <a:schemeClr val="accent1"/>
+            </a:effectRef>
+            <a:fontRef idx="minor">
+              <a:schemeClr val="tx1"/>
+            </a:fontRef>
+          </p:style>
+        </p:cxnSp>
+        <p:cxnSp>
+          <p:nvCxnSpPr>
+            <p:cNvPr id="64" name="Straight Arrow Connector 63"/>
+            <p:cNvCxnSpPr/>
+            <p:nvPr/>
+          </p:nvCxnSpPr>
+          <p:spPr>
+            <a:xfrm flipV="1">
+              <a:off x="1802608" y="3937000"/>
+              <a:ext cx="792" cy="1188720"/>
+            </a:xfrm>
+            <a:prstGeom prst="straightConnector1">
+              <a:avLst/>
+            </a:prstGeom>
+            <a:ln w="38100">
+              <a:solidFill>
+                <a:schemeClr val="tx1"/>
+              </a:solidFill>
+              <a:tailEnd type="none" w="lg" len="lg"/>
+            </a:ln>
+          </p:spPr>
+          <p:style>
+            <a:lnRef idx="1">
+              <a:schemeClr val="accent1"/>
+            </a:lnRef>
+            <a:fillRef idx="0">
+              <a:schemeClr val="accent1"/>
+            </a:fillRef>
+            <a:effectRef idx="0">
+              <a:schemeClr val="accent1"/>
+            </a:effectRef>
+            <a:fontRef idx="minor">
+              <a:schemeClr val="tx1"/>
+            </a:fontRef>
+          </p:style>
+        </p:cxnSp>
+        <p:cxnSp>
+          <p:nvCxnSpPr>
+            <p:cNvPr id="65" name="Straight Arrow Connector 64"/>
+            <p:cNvCxnSpPr/>
+            <p:nvPr/>
+          </p:nvCxnSpPr>
+          <p:spPr>
+            <a:xfrm>
+              <a:off x="1797549" y="5118100"/>
+              <a:ext cx="3291840" cy="0"/>
+            </a:xfrm>
+            <a:prstGeom prst="straightConnector1">
+              <a:avLst/>
+            </a:prstGeom>
+            <a:ln w="22225">
+              <a:solidFill>
+                <a:schemeClr val="tx1"/>
+              </a:solidFill>
+              <a:tailEnd type="stealth" w="lg" len="lg"/>
+            </a:ln>
+          </p:spPr>
+          <p:style>
+            <a:lnRef idx="1">
+              <a:schemeClr val="accent1"/>
+            </a:lnRef>
+            <a:fillRef idx="0">
+              <a:schemeClr val="accent1"/>
+            </a:fillRef>
+            <a:effectRef idx="0">
+              <a:schemeClr val="accent1"/>
+            </a:effectRef>
+            <a:fontRef idx="minor">
+              <a:schemeClr val="tx1"/>
+            </a:fontRef>
+          </p:style>
+        </p:cxnSp>
+        <p:cxnSp>
+          <p:nvCxnSpPr>
+            <p:cNvPr id="66" name="Straight Arrow Connector 65"/>
+            <p:cNvCxnSpPr/>
+            <p:nvPr/>
+          </p:nvCxnSpPr>
+          <p:spPr>
+            <a:xfrm>
+              <a:off x="1822171" y="4838700"/>
+              <a:ext cx="3200400" cy="0"/>
+            </a:xfrm>
+            <a:prstGeom prst="straightConnector1">
+              <a:avLst/>
+            </a:prstGeom>
+            <a:ln w="12700">
+              <a:solidFill>
+                <a:schemeClr val="tx1"/>
+              </a:solidFill>
+              <a:tailEnd type="none" w="lg" len="lg"/>
+            </a:ln>
+          </p:spPr>
+          <p:style>
+            <a:lnRef idx="1">
+              <a:schemeClr val="accent1"/>
+            </a:lnRef>
+            <a:fillRef idx="0">
+              <a:schemeClr val="accent1"/>
+            </a:fillRef>
+            <a:effectRef idx="0">
+              <a:schemeClr val="accent1"/>
+            </a:effectRef>
+            <a:fontRef idx="minor">
+              <a:schemeClr val="tx1"/>
+            </a:fontRef>
+          </p:style>
+        </p:cxnSp>
+        <p:cxnSp>
+          <p:nvCxnSpPr>
+            <p:cNvPr id="67" name="Straight Arrow Connector 66"/>
+            <p:cNvCxnSpPr/>
+            <p:nvPr/>
+          </p:nvCxnSpPr>
+          <p:spPr>
+            <a:xfrm>
+              <a:off x="1784071" y="4267200"/>
+              <a:ext cx="3246120" cy="0"/>
+            </a:xfrm>
+            <a:prstGeom prst="straightConnector1">
+              <a:avLst/>
+            </a:prstGeom>
+            <a:ln w="12700">
+              <a:solidFill>
+                <a:schemeClr val="tx1"/>
+              </a:solidFill>
+              <a:tailEnd type="none" w="lg" len="lg"/>
+            </a:ln>
+          </p:spPr>
+          <p:style>
+            <a:lnRef idx="1">
+              <a:schemeClr val="accent1"/>
+            </a:lnRef>
+            <a:fillRef idx="0">
+              <a:schemeClr val="accent1"/>
+            </a:fillRef>
+            <a:effectRef idx="0">
+              <a:schemeClr val="accent1"/>
+            </a:effectRef>
+            <a:fontRef idx="minor">
+              <a:schemeClr val="tx1"/>
+            </a:fontRef>
+          </p:style>
+        </p:cxnSp>
+        <p:sp>
+          <p:nvSpPr>
+            <p:cNvPr id="68" name="Rectangle 67"/>
+            <p:cNvSpPr/>
+            <p:nvPr/>
+          </p:nvSpPr>
+          <p:spPr>
+            <a:xfrm>
+              <a:off x="1116514" y="4095036"/>
+              <a:ext cx="703458" cy="315471"/>
+            </a:xfrm>
+            <a:prstGeom prst="rect">
+              <a:avLst/>
+            </a:prstGeom>
+          </p:spPr>
+          <p:txBody>
+            <a:bodyPr wrap="none" lIns="68580" tIns="34290" rIns="68580" bIns="34290">
+              <a:noAutofit/>
+            </a:bodyPr>
+            <a:lstStyle/>
+            <a:p>
+              <a:pPr algn="ctr"/>
+              <a:r>
+                <a:rPr lang="en-US" sz="1600" b="1" dirty="0"/>
+                <a:t>v</a:t>
+              </a:r>
+              <a:r>
+                <a:rPr lang="en-US" sz="1600" b="1" dirty="0" smtClean="0"/>
+                <a:t>1</a:t>
+              </a:r>
+              <a:endParaRPr lang="en-US" sz="1600" b="1" dirty="0"/>
+            </a:p>
+          </p:txBody>
+        </p:sp>
+        <p:sp>
+          <p:nvSpPr>
+            <p:cNvPr id="69" name="Rectangle 68"/>
+            <p:cNvSpPr/>
+            <p:nvPr/>
+          </p:nvSpPr>
+          <p:spPr>
+            <a:xfrm>
+              <a:off x="1116514" y="4374436"/>
+              <a:ext cx="703458" cy="315471"/>
+            </a:xfrm>
+            <a:prstGeom prst="rect">
+              <a:avLst/>
+            </a:prstGeom>
+          </p:spPr>
+          <p:txBody>
+            <a:bodyPr wrap="none" lIns="68580" tIns="34290" rIns="68580" bIns="34290">
+              <a:noAutofit/>
+            </a:bodyPr>
+            <a:lstStyle/>
+            <a:p>
+              <a:pPr algn="ctr"/>
+              <a:r>
+                <a:rPr lang="en-US" sz="1600" b="1" dirty="0" smtClean="0"/>
+                <a:t>v</a:t>
+              </a:r>
+              <a:r>
+                <a:rPr lang="en-US" sz="1600" b="1" dirty="0"/>
+                <a:t>2</a:t>
+              </a:r>
+              <a:endParaRPr lang="en-US" sz="1600" b="1" dirty="0"/>
+            </a:p>
+          </p:txBody>
+        </p:sp>
+        <p:sp>
+          <p:nvSpPr>
+            <p:cNvPr id="70" name="Rectangle 69"/>
+            <p:cNvSpPr/>
+            <p:nvPr/>
+          </p:nvSpPr>
+          <p:spPr>
+            <a:xfrm>
+              <a:off x="1116514" y="4679236"/>
+              <a:ext cx="703458" cy="315471"/>
+            </a:xfrm>
+            <a:prstGeom prst="rect">
+              <a:avLst/>
+            </a:prstGeom>
+          </p:spPr>
+          <p:txBody>
+            <a:bodyPr wrap="none" lIns="68580" tIns="34290" rIns="68580" bIns="34290">
+              <a:noAutofit/>
+            </a:bodyPr>
+            <a:lstStyle/>
+            <a:p>
+              <a:pPr algn="ctr"/>
+              <a:r>
+                <a:rPr lang="en-US" sz="1600" b="1" dirty="0" smtClean="0"/>
+                <a:t>v</a:t>
+              </a:r>
+              <a:r>
+                <a:rPr lang="en-US" sz="1600" b="1" dirty="0"/>
+                <a:t>3</a:t>
+              </a:r>
+              <a:endParaRPr lang="en-US" sz="1600" b="1" dirty="0"/>
+            </a:p>
+          </p:txBody>
+        </p:sp>
+        <p:cxnSp>
+          <p:nvCxnSpPr>
+            <p:cNvPr id="71" name="Straight Arrow Connector 70"/>
+            <p:cNvCxnSpPr/>
+            <p:nvPr/>
+          </p:nvCxnSpPr>
+          <p:spPr>
+            <a:xfrm>
+              <a:off x="2548018" y="4557571"/>
+              <a:ext cx="822960" cy="0"/>
+            </a:xfrm>
+            <a:prstGeom prst="straightConnector1">
+              <a:avLst/>
+            </a:prstGeom>
+            <a:ln w="12700">
+              <a:solidFill>
+                <a:schemeClr val="tx1"/>
+              </a:solidFill>
+              <a:tailEnd type="none" w="lg" len="lg"/>
+            </a:ln>
+          </p:spPr>
+          <p:style>
+            <a:lnRef idx="1">
+              <a:schemeClr val="accent1"/>
+            </a:lnRef>
+            <a:fillRef idx="0">
+              <a:schemeClr val="accent1"/>
+            </a:fillRef>
+            <a:effectRef idx="0">
+              <a:schemeClr val="accent1"/>
+            </a:effectRef>
+            <a:fontRef idx="minor">
+              <a:schemeClr val="tx1"/>
+            </a:fontRef>
+          </p:style>
+        </p:cxnSp>
+        <p:cxnSp>
+          <p:nvCxnSpPr>
+            <p:cNvPr id="72" name="Straight Arrow Connector 71"/>
+            <p:cNvCxnSpPr/>
+            <p:nvPr/>
+          </p:nvCxnSpPr>
+          <p:spPr>
+            <a:xfrm>
+              <a:off x="3394130" y="4557571"/>
+              <a:ext cx="1645920" cy="0"/>
+            </a:xfrm>
+            <a:prstGeom prst="straightConnector1">
+              <a:avLst/>
+            </a:prstGeom>
+            <a:ln w="12700">
+              <a:solidFill>
+                <a:schemeClr val="tx1"/>
+              </a:solidFill>
+              <a:tailEnd type="none" w="lg" len="lg"/>
+            </a:ln>
+          </p:spPr>
+          <p:style>
+            <a:lnRef idx="1">
+              <a:schemeClr val="accent1"/>
+            </a:lnRef>
+            <a:fillRef idx="0">
+              <a:schemeClr val="accent1"/>
+            </a:fillRef>
+            <a:effectRef idx="0">
+              <a:schemeClr val="accent1"/>
+            </a:effectRef>
+            <a:fontRef idx="minor">
+              <a:schemeClr val="tx1"/>
+            </a:fontRef>
+          </p:style>
+        </p:cxnSp>
+        <p:sp>
+          <p:nvSpPr>
+            <p:cNvPr id="73" name="Oval 72"/>
+            <p:cNvSpPr/>
+            <p:nvPr/>
+          </p:nvSpPr>
+          <p:spPr>
+            <a:xfrm>
+              <a:off x="2500229" y="4227372"/>
+              <a:ext cx="91440" cy="91440"/>
+            </a:xfrm>
+            <a:prstGeom prst="ellipse">
+              <a:avLst/>
+            </a:prstGeom>
+            <a:solidFill>
+              <a:srgbClr val="0070C0"/>
+            </a:solidFill>
+          </p:spPr>
+          <p:style>
+            <a:lnRef idx="2">
+              <a:schemeClr val="accent1">
+                <a:shade val="50000"/>
+              </a:schemeClr>
+            </a:lnRef>
+            <a:fillRef idx="1">
+              <a:schemeClr val="accent1"/>
+            </a:fillRef>
+            <a:effectRef idx="0">
+              <a:schemeClr val="accent1"/>
+            </a:effectRef>
+            <a:fontRef idx="minor">
+              <a:schemeClr val="lt1"/>
+            </a:fontRef>
+          </p:style>
+          <p:txBody>
+            <a:bodyPr rtlCol="0" anchor="ctr"/>
+            <a:lstStyle/>
+            <a:p>
+              <a:pPr algn="ctr"/>
+              <a:endParaRPr lang="en-US"/>
+            </a:p>
+          </p:txBody>
+        </p:sp>
+        <p:sp>
+          <p:nvSpPr>
+            <p:cNvPr id="74" name="Oval 73"/>
+            <p:cNvSpPr/>
+            <p:nvPr/>
+          </p:nvSpPr>
+          <p:spPr>
+            <a:xfrm>
+              <a:off x="3351129" y="4519472"/>
+              <a:ext cx="91440" cy="91440"/>
+            </a:xfrm>
+            <a:prstGeom prst="ellipse">
+              <a:avLst/>
+            </a:prstGeom>
+            <a:solidFill>
+              <a:srgbClr val="0070C0"/>
+            </a:solidFill>
+          </p:spPr>
+          <p:style>
+            <a:lnRef idx="2">
+              <a:schemeClr val="accent1">
+                <a:shade val="50000"/>
+              </a:schemeClr>
+            </a:lnRef>
+            <a:fillRef idx="1">
+              <a:schemeClr val="accent1"/>
+            </a:fillRef>
+            <a:effectRef idx="0">
+              <a:schemeClr val="accent1"/>
+            </a:effectRef>
+            <a:fontRef idx="minor">
+              <a:schemeClr val="lt1"/>
+            </a:fontRef>
+          </p:style>
+          <p:txBody>
+            <a:bodyPr rtlCol="0" anchor="ctr"/>
+            <a:lstStyle/>
+            <a:p>
+              <a:pPr algn="ctr"/>
+              <a:endParaRPr lang="en-US"/>
+            </a:p>
+          </p:txBody>
+        </p:sp>
+        <p:sp>
+          <p:nvSpPr>
+            <p:cNvPr id="75" name="Oval 74"/>
+            <p:cNvSpPr/>
+            <p:nvPr/>
+          </p:nvSpPr>
+          <p:spPr>
+            <a:xfrm>
+              <a:off x="3351129" y="4227372"/>
+              <a:ext cx="91440" cy="91440"/>
+            </a:xfrm>
+            <a:prstGeom prst="ellipse">
+              <a:avLst/>
+            </a:prstGeom>
+            <a:solidFill>
+              <a:srgbClr val="0070C0"/>
+            </a:solidFill>
+          </p:spPr>
+          <p:style>
+            <a:lnRef idx="2">
+              <a:schemeClr val="accent1">
+                <a:shade val="50000"/>
+              </a:schemeClr>
+            </a:lnRef>
+            <a:fillRef idx="1">
+              <a:schemeClr val="accent1"/>
+            </a:fillRef>
+            <a:effectRef idx="0">
+              <a:schemeClr val="accent1"/>
+            </a:effectRef>
+            <a:fontRef idx="minor">
+              <a:schemeClr val="lt1"/>
+            </a:fontRef>
+          </p:style>
+          <p:txBody>
+            <a:bodyPr rtlCol="0" anchor="ctr"/>
+            <a:lstStyle/>
+            <a:p>
+              <a:pPr algn="ctr"/>
+              <a:endParaRPr lang="en-US"/>
+            </a:p>
+          </p:txBody>
+        </p:sp>
+        <p:sp>
+          <p:nvSpPr>
+            <p:cNvPr id="76" name="Oval 75"/>
+            <p:cNvSpPr/>
+            <p:nvPr/>
+          </p:nvSpPr>
+          <p:spPr>
+            <a:xfrm>
+              <a:off x="4138529" y="4227372"/>
+              <a:ext cx="91440" cy="91440"/>
+            </a:xfrm>
+            <a:prstGeom prst="ellipse">
+              <a:avLst/>
+            </a:prstGeom>
+            <a:solidFill>
+              <a:srgbClr val="0070C0"/>
+            </a:solidFill>
+          </p:spPr>
+          <p:style>
+            <a:lnRef idx="2">
+              <a:schemeClr val="accent1">
+                <a:shade val="50000"/>
+              </a:schemeClr>
+            </a:lnRef>
+            <a:fillRef idx="1">
+              <a:schemeClr val="accent1"/>
+            </a:fillRef>
+            <a:effectRef idx="0">
+              <a:schemeClr val="accent1"/>
+            </a:effectRef>
+            <a:fontRef idx="minor">
+              <a:schemeClr val="lt1"/>
+            </a:fontRef>
+          </p:style>
+          <p:txBody>
+            <a:bodyPr rtlCol="0" anchor="ctr"/>
+            <a:lstStyle/>
+            <a:p>
+              <a:pPr algn="ctr"/>
+              <a:endParaRPr lang="en-US"/>
+            </a:p>
+          </p:txBody>
+        </p:sp>
+        <p:sp>
+          <p:nvSpPr>
+            <p:cNvPr id="77" name="Oval 76"/>
+            <p:cNvSpPr/>
+            <p:nvPr/>
+          </p:nvSpPr>
+          <p:spPr>
+            <a:xfrm>
+              <a:off x="2500229" y="4798872"/>
+              <a:ext cx="91440" cy="91440"/>
+            </a:xfrm>
+            <a:prstGeom prst="ellipse">
+              <a:avLst/>
+            </a:prstGeom>
+            <a:solidFill>
+              <a:srgbClr val="0070C0"/>
+            </a:solidFill>
+          </p:spPr>
+          <p:style>
+            <a:lnRef idx="2">
+              <a:schemeClr val="accent1">
+                <a:shade val="50000"/>
+              </a:schemeClr>
+            </a:lnRef>
+            <a:fillRef idx="1">
+              <a:schemeClr val="accent1"/>
+            </a:fillRef>
+            <a:effectRef idx="0">
+              <a:schemeClr val="accent1"/>
+            </a:effectRef>
+            <a:fontRef idx="minor">
+              <a:schemeClr val="lt1"/>
+            </a:fontRef>
+          </p:style>
+          <p:txBody>
+            <a:bodyPr rtlCol="0" anchor="ctr"/>
+            <a:lstStyle/>
+            <a:p>
+              <a:pPr algn="ctr"/>
+              <a:endParaRPr lang="en-US"/>
+            </a:p>
+          </p:txBody>
+        </p:sp>
+        <p:sp>
+          <p:nvSpPr>
+            <p:cNvPr id="78" name="Oval 77"/>
+            <p:cNvSpPr/>
+            <p:nvPr/>
+          </p:nvSpPr>
+          <p:spPr>
+            <a:xfrm>
+              <a:off x="3351129" y="4798872"/>
+              <a:ext cx="91440" cy="91440"/>
+            </a:xfrm>
+            <a:prstGeom prst="ellipse">
+              <a:avLst/>
+            </a:prstGeom>
+            <a:solidFill>
+              <a:srgbClr val="0070C0"/>
+            </a:solidFill>
+          </p:spPr>
+          <p:style>
+            <a:lnRef idx="2">
+              <a:schemeClr val="accent1">
+                <a:shade val="50000"/>
+              </a:schemeClr>
+            </a:lnRef>
+            <a:fillRef idx="1">
+              <a:schemeClr val="accent1"/>
+            </a:fillRef>
+            <a:effectRef idx="0">
+              <a:schemeClr val="accent1"/>
+            </a:effectRef>
+            <a:fontRef idx="minor">
+              <a:schemeClr val="lt1"/>
+            </a:fontRef>
+          </p:style>
+          <p:txBody>
+            <a:bodyPr rtlCol="0" anchor="ctr"/>
+            <a:lstStyle/>
+            <a:p>
+              <a:pPr algn="ctr"/>
+              <a:endParaRPr lang="en-US"/>
+            </a:p>
+          </p:txBody>
+        </p:sp>
+        <p:sp>
+          <p:nvSpPr>
+            <p:cNvPr id="79" name="Oval 78"/>
+            <p:cNvSpPr/>
+            <p:nvPr/>
+          </p:nvSpPr>
+          <p:spPr>
+            <a:xfrm>
+              <a:off x="4138529" y="4798872"/>
+              <a:ext cx="91440" cy="91440"/>
+            </a:xfrm>
+            <a:prstGeom prst="ellipse">
+              <a:avLst/>
+            </a:prstGeom>
+            <a:solidFill>
+              <a:srgbClr val="0070C0"/>
+            </a:solidFill>
+          </p:spPr>
+          <p:style>
+            <a:lnRef idx="2">
+              <a:schemeClr val="accent1">
+                <a:shade val="50000"/>
+              </a:schemeClr>
+            </a:lnRef>
+            <a:fillRef idx="1">
+              <a:schemeClr val="accent1"/>
+            </a:fillRef>
+            <a:effectRef idx="0">
+              <a:schemeClr val="accent1"/>
+            </a:effectRef>
+            <a:fontRef idx="minor">
+              <a:schemeClr val="lt1"/>
+            </a:fontRef>
+          </p:style>
+          <p:txBody>
+            <a:bodyPr rtlCol="0" anchor="ctr"/>
+            <a:lstStyle/>
+            <a:p>
+              <a:pPr algn="ctr"/>
+              <a:endParaRPr lang="en-US"/>
+            </a:p>
+          </p:txBody>
+        </p:sp>
+        <p:sp>
+          <p:nvSpPr>
+            <p:cNvPr id="80" name="Rectangle 79"/>
+            <p:cNvSpPr/>
+            <p:nvPr/>
+          </p:nvSpPr>
+          <p:spPr>
+            <a:xfrm>
+              <a:off x="1842779" y="3966308"/>
+              <a:ext cx="703458" cy="315471"/>
+            </a:xfrm>
+            <a:prstGeom prst="rect">
+              <a:avLst/>
+            </a:prstGeom>
+          </p:spPr>
+          <p:txBody>
+            <a:bodyPr wrap="none" lIns="68580" tIns="34290" rIns="68580" bIns="34290">
+              <a:noAutofit/>
+            </a:bodyPr>
+            <a:lstStyle/>
+            <a:p>
+              <a:pPr algn="ctr"/>
+              <a:r>
+                <a:rPr lang="en-US" dirty="0" smtClean="0"/>
+                <a:t>[t1,t5)</a:t>
+              </a:r>
+              <a:endParaRPr lang="en-US" dirty="0"/>
+            </a:p>
+          </p:txBody>
+        </p:sp>
+        <p:sp>
+          <p:nvSpPr>
+            <p:cNvPr id="81" name="Rectangle 80"/>
+            <p:cNvSpPr/>
+            <p:nvPr/>
+          </p:nvSpPr>
+          <p:spPr>
+            <a:xfrm>
+              <a:off x="1842779" y="4550508"/>
+              <a:ext cx="703458" cy="315471"/>
+            </a:xfrm>
+            <a:prstGeom prst="rect">
+              <a:avLst/>
+            </a:prstGeom>
+          </p:spPr>
+          <p:txBody>
+            <a:bodyPr wrap="none" lIns="68580" tIns="34290" rIns="68580" bIns="34290">
+              <a:noAutofit/>
+            </a:bodyPr>
+            <a:lstStyle/>
+            <a:p>
+              <a:pPr algn="ctr"/>
+              <a:r>
+                <a:rPr lang="en-US" dirty="0" smtClean="0"/>
+                <a:t>[t1,t5)</a:t>
+              </a:r>
+              <a:endParaRPr lang="en-US" dirty="0"/>
+            </a:p>
+          </p:txBody>
+        </p:sp>
+        <p:sp>
+          <p:nvSpPr>
+            <p:cNvPr id="82" name="Rectangle 81"/>
+            <p:cNvSpPr/>
+            <p:nvPr/>
+          </p:nvSpPr>
+          <p:spPr>
+            <a:xfrm>
+              <a:off x="2617341" y="3966308"/>
+              <a:ext cx="703458" cy="315471"/>
+            </a:xfrm>
+            <a:prstGeom prst="rect">
+              <a:avLst/>
+            </a:prstGeom>
+          </p:spPr>
+          <p:txBody>
+            <a:bodyPr wrap="none" lIns="68580" tIns="34290" rIns="68580" bIns="34290">
+              <a:noAutofit/>
+            </a:bodyPr>
+            <a:lstStyle/>
+            <a:p>
+              <a:pPr algn="ctr"/>
+              <a:r>
+                <a:rPr lang="en-US" dirty="0" smtClean="0"/>
+                <a:t>[t1,t5)</a:t>
+              </a:r>
+              <a:endParaRPr lang="en-US" dirty="0"/>
+            </a:p>
+          </p:txBody>
+        </p:sp>
+        <p:sp>
+          <p:nvSpPr>
+            <p:cNvPr id="83" name="Rectangle 82"/>
+            <p:cNvSpPr/>
+            <p:nvPr/>
+          </p:nvSpPr>
+          <p:spPr>
+            <a:xfrm>
+              <a:off x="2617341" y="4283808"/>
+              <a:ext cx="703458" cy="315471"/>
+            </a:xfrm>
+            <a:prstGeom prst="rect">
+              <a:avLst/>
+            </a:prstGeom>
+          </p:spPr>
+          <p:txBody>
+            <a:bodyPr wrap="none" lIns="68580" tIns="34290" rIns="68580" bIns="34290">
+              <a:noAutofit/>
+            </a:bodyPr>
+            <a:lstStyle/>
+            <a:p>
+              <a:pPr algn="ctr"/>
+              <a:r>
+                <a:rPr lang="en-US" dirty="0" smtClean="0"/>
+                <a:t>[t2,t3)</a:t>
+              </a:r>
+              <a:endParaRPr lang="en-US" dirty="0"/>
+            </a:p>
+          </p:txBody>
+        </p:sp>
+        <p:sp>
+          <p:nvSpPr>
+            <p:cNvPr id="84" name="Rectangle 83"/>
+            <p:cNvSpPr/>
+            <p:nvPr/>
+          </p:nvSpPr>
+          <p:spPr>
+            <a:xfrm>
+              <a:off x="2617341" y="4550508"/>
+              <a:ext cx="703458" cy="315471"/>
+            </a:xfrm>
+            <a:prstGeom prst="rect">
+              <a:avLst/>
+            </a:prstGeom>
+          </p:spPr>
+          <p:txBody>
+            <a:bodyPr wrap="none" lIns="68580" tIns="34290" rIns="68580" bIns="34290">
+              <a:noAutofit/>
+            </a:bodyPr>
+            <a:lstStyle/>
+            <a:p>
+              <a:pPr algn="ctr"/>
+              <a:r>
+                <a:rPr lang="en-US" dirty="0" smtClean="0"/>
+                <a:t>[t1,t5)</a:t>
+              </a:r>
+              <a:endParaRPr lang="en-US" dirty="0"/>
+            </a:p>
+          </p:txBody>
+        </p:sp>
+        <p:sp>
+          <p:nvSpPr>
+            <p:cNvPr id="85" name="Rectangle 84"/>
+            <p:cNvSpPr/>
+            <p:nvPr/>
+          </p:nvSpPr>
+          <p:spPr>
+            <a:xfrm>
+              <a:off x="3430141" y="3966308"/>
+              <a:ext cx="703458" cy="315471"/>
+            </a:xfrm>
+            <a:prstGeom prst="rect">
+              <a:avLst/>
+            </a:prstGeom>
+          </p:spPr>
+          <p:txBody>
+            <a:bodyPr wrap="none" lIns="68580" tIns="34290" rIns="68580" bIns="34290">
+              <a:noAutofit/>
+            </a:bodyPr>
+            <a:lstStyle/>
+            <a:p>
+              <a:pPr algn="ctr"/>
+              <a:r>
+                <a:rPr lang="en-US" dirty="0" smtClean="0"/>
+                <a:t>[t1,t5)</a:t>
+              </a:r>
+              <a:endParaRPr lang="en-US" dirty="0"/>
+            </a:p>
+          </p:txBody>
+        </p:sp>
+        <p:sp>
+          <p:nvSpPr>
+            <p:cNvPr id="86" name="Rectangle 85"/>
+            <p:cNvSpPr/>
+            <p:nvPr/>
+          </p:nvSpPr>
+          <p:spPr>
+            <a:xfrm>
+              <a:off x="3430141" y="4283808"/>
+              <a:ext cx="703458" cy="315471"/>
+            </a:xfrm>
+            <a:prstGeom prst="rect">
+              <a:avLst/>
+            </a:prstGeom>
+          </p:spPr>
+          <p:txBody>
+            <a:bodyPr wrap="none" lIns="68580" tIns="34290" rIns="68580" bIns="34290">
+              <a:noAutofit/>
+            </a:bodyPr>
+            <a:lstStyle/>
+            <a:p>
+              <a:pPr algn="ctr"/>
+              <a:r>
+                <a:rPr lang="en-US" dirty="0" smtClean="0"/>
+                <a:t>[t3,t5)</a:t>
+              </a:r>
+              <a:endParaRPr lang="en-US" dirty="0"/>
+            </a:p>
+          </p:txBody>
+        </p:sp>
+        <p:sp>
+          <p:nvSpPr>
+            <p:cNvPr id="87" name="Rectangle 86"/>
+            <p:cNvSpPr/>
+            <p:nvPr/>
+          </p:nvSpPr>
+          <p:spPr>
+            <a:xfrm>
+              <a:off x="3430141" y="4550508"/>
+              <a:ext cx="703458" cy="315471"/>
+            </a:xfrm>
+            <a:prstGeom prst="rect">
+              <a:avLst/>
+            </a:prstGeom>
+          </p:spPr>
+          <p:txBody>
+            <a:bodyPr wrap="none" lIns="68580" tIns="34290" rIns="68580" bIns="34290">
+              <a:noAutofit/>
+            </a:bodyPr>
+            <a:lstStyle/>
+            <a:p>
+              <a:pPr algn="ctr"/>
+              <a:r>
+                <a:rPr lang="en-US" dirty="0" smtClean="0"/>
+                <a:t>[t1,t5)</a:t>
+              </a:r>
+              <a:endParaRPr lang="en-US" dirty="0"/>
+            </a:p>
+          </p:txBody>
+        </p:sp>
+        <p:sp>
+          <p:nvSpPr>
+            <p:cNvPr id="88" name="Rectangle 87"/>
+            <p:cNvSpPr/>
+            <p:nvPr/>
+          </p:nvSpPr>
+          <p:spPr>
+            <a:xfrm>
+              <a:off x="4268341" y="3966308"/>
+              <a:ext cx="703458" cy="315471"/>
+            </a:xfrm>
+            <a:prstGeom prst="rect">
+              <a:avLst/>
+            </a:prstGeom>
+          </p:spPr>
+          <p:txBody>
+            <a:bodyPr wrap="none" lIns="68580" tIns="34290" rIns="68580" bIns="34290">
+              <a:noAutofit/>
+            </a:bodyPr>
+            <a:lstStyle/>
+            <a:p>
+              <a:pPr algn="ctr"/>
+              <a:r>
+                <a:rPr lang="en-US" dirty="0" smtClean="0"/>
+                <a:t>[t1,t5)</a:t>
+              </a:r>
+              <a:endParaRPr lang="en-US" dirty="0"/>
+            </a:p>
+          </p:txBody>
+        </p:sp>
+        <p:sp>
+          <p:nvSpPr>
+            <p:cNvPr id="89" name="Rectangle 88"/>
+            <p:cNvSpPr/>
+            <p:nvPr/>
+          </p:nvSpPr>
+          <p:spPr>
+            <a:xfrm>
+              <a:off x="4268341" y="4283808"/>
+              <a:ext cx="703458" cy="315471"/>
+            </a:xfrm>
+            <a:prstGeom prst="rect">
+              <a:avLst/>
+            </a:prstGeom>
+          </p:spPr>
+          <p:txBody>
+            <a:bodyPr wrap="none" lIns="68580" tIns="34290" rIns="68580" bIns="34290">
+              <a:noAutofit/>
+            </a:bodyPr>
+            <a:lstStyle/>
+            <a:p>
+              <a:pPr algn="ctr"/>
+              <a:r>
+                <a:rPr lang="en-US" dirty="0" smtClean="0"/>
+                <a:t>[t3,t5)</a:t>
+              </a:r>
+              <a:endParaRPr lang="en-US" dirty="0"/>
+            </a:p>
+          </p:txBody>
+        </p:sp>
+        <p:sp>
+          <p:nvSpPr>
+            <p:cNvPr id="90" name="Rectangle 89"/>
+            <p:cNvSpPr/>
+            <p:nvPr/>
+          </p:nvSpPr>
+          <p:spPr>
+            <a:xfrm>
+              <a:off x="4268341" y="4550508"/>
+              <a:ext cx="703458" cy="315471"/>
+            </a:xfrm>
+            <a:prstGeom prst="rect">
+              <a:avLst/>
+            </a:prstGeom>
+          </p:spPr>
+          <p:txBody>
+            <a:bodyPr wrap="none" lIns="68580" tIns="34290" rIns="68580" bIns="34290">
+              <a:noAutofit/>
+            </a:bodyPr>
+            <a:lstStyle/>
+            <a:p>
+              <a:pPr algn="ctr"/>
+              <a:r>
+                <a:rPr lang="en-US" dirty="0" smtClean="0"/>
+                <a:t>[t1,t5)</a:t>
+              </a:r>
+              <a:endParaRPr lang="en-US" dirty="0"/>
+            </a:p>
+          </p:txBody>
+        </p:sp>
+        <p:sp>
+          <p:nvSpPr>
+            <p:cNvPr id="92" name="Oval 91"/>
+            <p:cNvSpPr/>
+            <p:nvPr/>
+          </p:nvSpPr>
+          <p:spPr>
+            <a:xfrm>
+              <a:off x="4138529" y="4519472"/>
+              <a:ext cx="91440" cy="91440"/>
+            </a:xfrm>
+            <a:prstGeom prst="ellipse">
+              <a:avLst/>
+            </a:prstGeom>
+            <a:solidFill>
+              <a:srgbClr val="0070C0"/>
+            </a:solidFill>
+          </p:spPr>
+          <p:style>
+            <a:lnRef idx="2">
+              <a:schemeClr val="accent1">
+                <a:shade val="50000"/>
+              </a:schemeClr>
+            </a:lnRef>
+            <a:fillRef idx="1">
+              <a:schemeClr val="accent1"/>
+            </a:fillRef>
+            <a:effectRef idx="0">
+              <a:schemeClr val="accent1"/>
+            </a:effectRef>
+            <a:fontRef idx="minor">
+              <a:schemeClr val="lt1"/>
+            </a:fontRef>
+          </p:style>
+          <p:txBody>
+            <a:bodyPr rtlCol="0" anchor="ctr"/>
+            <a:lstStyle/>
+            <a:p>
+              <a:pPr algn="ctr"/>
+              <a:endParaRPr lang="en-US"/>
+            </a:p>
+          </p:txBody>
+        </p:sp>
+      </p:grpSp>
+    </p:spTree>
+    <p:extLst>
+      <p:ext uri="{BB962C8B-B14F-4D97-AF65-F5344CB8AC3E}">
+        <p14:creationId xmlns:p14="http://schemas.microsoft.com/office/powerpoint/2010/main" val="845020673"/>
       </p:ext>
     </p:extLst>
   </p:cSld>

</xml_diff>